<commit_message>
Update Team Member Roles
</commit_message>
<xml_diff>
--- a/Team Member Roles.pptx
+++ b/Team Member Roles.pptx
@@ -288,7 +288,7 @@
           <a:p>
             <a:fld id="{A4D5AEB8-79A1-48D4-BACB-1638CFEAD342}" type="datetimeFigureOut">
               <a:rPr lang="en-US" smtClean="0"/>
-              <a:t>9/1/2017</a:t>
+              <a:t>9/6/2017</a:t>
             </a:fld>
             <a:endParaRPr lang="en-US" dirty="0"/>
           </a:p>
@@ -458,7 +458,7 @@
           <a:p>
             <a:fld id="{A4D5AEB8-79A1-48D4-BACB-1638CFEAD342}" type="datetimeFigureOut">
               <a:rPr lang="en-US" smtClean="0"/>
-              <a:t>9/1/2017</a:t>
+              <a:t>9/6/2017</a:t>
             </a:fld>
             <a:endParaRPr lang="en-US" dirty="0"/>
           </a:p>
@@ -638,7 +638,7 @@
           <a:p>
             <a:fld id="{A4D5AEB8-79A1-48D4-BACB-1638CFEAD342}" type="datetimeFigureOut">
               <a:rPr lang="en-US" smtClean="0"/>
-              <a:t>9/1/2017</a:t>
+              <a:t>9/6/2017</a:t>
             </a:fld>
             <a:endParaRPr lang="en-US" dirty="0"/>
           </a:p>
@@ -808,7 +808,7 @@
           <a:p>
             <a:fld id="{A4D5AEB8-79A1-48D4-BACB-1638CFEAD342}" type="datetimeFigureOut">
               <a:rPr lang="en-US" smtClean="0"/>
-              <a:t>9/1/2017</a:t>
+              <a:t>9/6/2017</a:t>
             </a:fld>
             <a:endParaRPr lang="en-US" dirty="0"/>
           </a:p>
@@ -1054,7 +1054,7 @@
           <a:p>
             <a:fld id="{A4D5AEB8-79A1-48D4-BACB-1638CFEAD342}" type="datetimeFigureOut">
               <a:rPr lang="en-US" smtClean="0"/>
-              <a:t>9/1/2017</a:t>
+              <a:t>9/6/2017</a:t>
             </a:fld>
             <a:endParaRPr lang="en-US" dirty="0"/>
           </a:p>
@@ -1342,7 +1342,7 @@
           <a:p>
             <a:fld id="{A4D5AEB8-79A1-48D4-BACB-1638CFEAD342}" type="datetimeFigureOut">
               <a:rPr lang="en-US" smtClean="0"/>
-              <a:t>9/1/2017</a:t>
+              <a:t>9/6/2017</a:t>
             </a:fld>
             <a:endParaRPr lang="en-US" dirty="0"/>
           </a:p>
@@ -1764,7 +1764,7 @@
           <a:p>
             <a:fld id="{A4D5AEB8-79A1-48D4-BACB-1638CFEAD342}" type="datetimeFigureOut">
               <a:rPr lang="en-US" smtClean="0"/>
-              <a:t>9/1/2017</a:t>
+              <a:t>9/6/2017</a:t>
             </a:fld>
             <a:endParaRPr lang="en-US" dirty="0"/>
           </a:p>
@@ -1882,7 +1882,7 @@
           <a:p>
             <a:fld id="{A4D5AEB8-79A1-48D4-BACB-1638CFEAD342}" type="datetimeFigureOut">
               <a:rPr lang="en-US" smtClean="0"/>
-              <a:t>9/1/2017</a:t>
+              <a:t>9/6/2017</a:t>
             </a:fld>
             <a:endParaRPr lang="en-US" dirty="0"/>
           </a:p>
@@ -1977,7 +1977,7 @@
           <a:p>
             <a:fld id="{A4D5AEB8-79A1-48D4-BACB-1638CFEAD342}" type="datetimeFigureOut">
               <a:rPr lang="en-US" smtClean="0"/>
-              <a:t>9/1/2017</a:t>
+              <a:t>9/6/2017</a:t>
             </a:fld>
             <a:endParaRPr lang="en-US" dirty="0"/>
           </a:p>
@@ -2254,7 +2254,7 @@
           <a:p>
             <a:fld id="{A4D5AEB8-79A1-48D4-BACB-1638CFEAD342}" type="datetimeFigureOut">
               <a:rPr lang="en-US" smtClean="0"/>
-              <a:t>9/1/2017</a:t>
+              <a:t>9/6/2017</a:t>
             </a:fld>
             <a:endParaRPr lang="en-US" dirty="0"/>
           </a:p>
@@ -2507,7 +2507,7 @@
           <a:p>
             <a:fld id="{A4D5AEB8-79A1-48D4-BACB-1638CFEAD342}" type="datetimeFigureOut">
               <a:rPr lang="en-US" smtClean="0"/>
-              <a:t>9/1/2017</a:t>
+              <a:t>9/6/2017</a:t>
             </a:fld>
             <a:endParaRPr lang="en-US" dirty="0"/>
           </a:p>
@@ -2720,7 +2720,7 @@
           <a:p>
             <a:fld id="{A4D5AEB8-79A1-48D4-BACB-1638CFEAD342}" type="datetimeFigureOut">
               <a:rPr lang="en-US" smtClean="0"/>
-              <a:t>9/1/2017</a:t>
+              <a:t>9/6/2017</a:t>
             </a:fld>
             <a:endParaRPr lang="en-US" dirty="0"/>
           </a:p>
@@ -3106,7 +3106,7 @@
         <p:spPr>
           <a:xfrm>
             <a:off x="457200" y="274638"/>
-            <a:ext cx="8229600" cy="1143000"/>
+            <a:ext cx="8229600" cy="792162"/>
           </a:xfrm>
           <a:prstGeom prst="rect">
             <a:avLst/>
@@ -3149,8 +3149,8 @@
         </p:nvSpPr>
         <p:spPr>
           <a:xfrm>
-            <a:off x="381000" y="1214124"/>
-            <a:ext cx="8458200" cy="5262979"/>
+            <a:off x="381000" y="1068647"/>
+            <a:ext cx="8458200" cy="5632311"/>
           </a:xfrm>
           <a:prstGeom prst="rect">
             <a:avLst/>
@@ -3171,17 +3171,14 @@
               <a:buChar char="•"/>
             </a:pPr>
             <a:r>
-              <a:rPr lang="en-US" sz="3200" dirty="0" smtClean="0"/>
-              <a:t>Team </a:t>
-            </a:r>
-            <a:r>
-              <a:rPr lang="en-US" sz="3200" dirty="0" smtClean="0"/>
-              <a:t>Leader/Project </a:t>
-            </a:r>
-            <a:r>
-              <a:rPr lang="en-US" sz="3200" dirty="0" smtClean="0"/>
-              <a:t>Manager</a:t>
-            </a:r>
+              <a:rPr lang="en-US" sz="3000" dirty="0" smtClean="0"/>
+              <a:t>Team Leader/Project </a:t>
+            </a:r>
+            <a:r>
+              <a:rPr lang="en-US" sz="3000" dirty="0" smtClean="0"/>
+              <a:t>Manager – Eliseo</a:t>
+            </a:r>
+            <a:endParaRPr lang="en-US" sz="3000" dirty="0" smtClean="0"/>
           </a:p>
           <a:p>
             <a:pPr marL="287338" indent="-287338">
@@ -3192,17 +3189,14 @@
               <a:buChar char="•"/>
             </a:pPr>
             <a:r>
-              <a:rPr lang="en-US" sz="3200" dirty="0" smtClean="0"/>
-              <a:t>Client-side</a:t>
-            </a:r>
-            <a:r>
-              <a:rPr lang="en-US" sz="3200" dirty="0" smtClean="0"/>
-              <a:t> </a:t>
-            </a:r>
-            <a:r>
-              <a:rPr lang="en-US" sz="3200" dirty="0" smtClean="0"/>
-              <a:t>Developer</a:t>
-            </a:r>
+              <a:rPr lang="en-US" sz="3000" dirty="0" smtClean="0"/>
+              <a:t>Client-side </a:t>
+            </a:r>
+            <a:r>
+              <a:rPr lang="en-US" sz="3000" dirty="0" smtClean="0"/>
+              <a:t>Developer – Jennifer, Andrea</a:t>
+            </a:r>
+            <a:endParaRPr lang="en-US" sz="3000" dirty="0" smtClean="0"/>
           </a:p>
           <a:p>
             <a:pPr marL="287338" indent="-287338">
@@ -3213,13 +3207,14 @@
               <a:buChar char="•"/>
             </a:pPr>
             <a:r>
-              <a:rPr lang="en-US" sz="3200" dirty="0" smtClean="0"/>
-              <a:t>Server-side</a:t>
-            </a:r>
-            <a:r>
-              <a:rPr lang="en-US" sz="3200" dirty="0" smtClean="0"/>
-              <a:t> Developer</a:t>
-            </a:r>
+              <a:rPr lang="en-US" sz="3000" dirty="0" smtClean="0"/>
+              <a:t>Server-side </a:t>
+            </a:r>
+            <a:r>
+              <a:rPr lang="en-US" sz="3000" dirty="0" smtClean="0"/>
+              <a:t>Developer – Jennifer, Alex, Eliseo</a:t>
+            </a:r>
+            <a:endParaRPr lang="en-US" sz="3000" dirty="0" smtClean="0"/>
           </a:p>
           <a:p>
             <a:pPr marL="287338" indent="-287338">
@@ -3230,10 +3225,14 @@
               <a:buChar char="•"/>
             </a:pPr>
             <a:r>
-              <a:rPr lang="en-US" sz="3200" dirty="0" smtClean="0"/>
-              <a:t>Database Manager</a:t>
-            </a:r>
-            <a:endParaRPr lang="en-US" sz="3200" dirty="0" smtClean="0"/>
+              <a:rPr lang="en-US" sz="3000" dirty="0" smtClean="0"/>
+              <a:t>Database </a:t>
+            </a:r>
+            <a:r>
+              <a:rPr lang="en-US" sz="3000" dirty="0" smtClean="0"/>
+              <a:t>Manager – Eliseo, Clark</a:t>
+            </a:r>
+            <a:endParaRPr lang="en-US" sz="3000" dirty="0" smtClean="0"/>
           </a:p>
           <a:p>
             <a:pPr marL="287338" indent="-287338">
@@ -3244,18 +3243,14 @@
               <a:buChar char="•"/>
             </a:pPr>
             <a:r>
-              <a:rPr lang="en-US" sz="3200" dirty="0" smtClean="0"/>
-              <a:t>UI/UX </a:t>
-            </a:r>
-            <a:r>
-              <a:rPr lang="en-US" sz="3200" dirty="0" smtClean="0"/>
-              <a:t>Design </a:t>
-            </a:r>
-            <a:r>
-              <a:rPr lang="en-US" sz="3200" dirty="0" smtClean="0"/>
-              <a:t>Manager</a:t>
-            </a:r>
-            <a:endParaRPr lang="en-US" sz="3200" dirty="0" smtClean="0"/>
+              <a:rPr lang="en-US" sz="3000" dirty="0" smtClean="0"/>
+              <a:t>UI/UX Design </a:t>
+            </a:r>
+            <a:r>
+              <a:rPr lang="en-US" sz="3000" dirty="0" smtClean="0"/>
+              <a:t>Manager – Alex, Jennifer</a:t>
+            </a:r>
+            <a:endParaRPr lang="en-US" sz="3000" dirty="0" smtClean="0"/>
           </a:p>
           <a:p>
             <a:pPr marL="287338" indent="-287338">
@@ -3266,10 +3261,14 @@
               <a:buChar char="•"/>
             </a:pPr>
             <a:r>
-              <a:rPr lang="en-US" sz="3200" dirty="0" smtClean="0"/>
-              <a:t>Test Manager</a:t>
-            </a:r>
-            <a:endParaRPr lang="en-US" sz="3200" dirty="0" smtClean="0"/>
+              <a:rPr lang="en-US" sz="3000" dirty="0" smtClean="0"/>
+              <a:t>Test </a:t>
+            </a:r>
+            <a:r>
+              <a:rPr lang="en-US" sz="3000" dirty="0" smtClean="0"/>
+              <a:t>Manager – Eliseo, Clark</a:t>
+            </a:r>
+            <a:endParaRPr lang="en-US" sz="3000" dirty="0" smtClean="0"/>
           </a:p>
           <a:p>
             <a:pPr marL="287338" indent="-287338">
@@ -3280,10 +3279,14 @@
               <a:buChar char="•"/>
             </a:pPr>
             <a:r>
-              <a:rPr lang="en-US" sz="3200" dirty="0" smtClean="0"/>
-              <a:t>Business Analyst/Requirements Manager</a:t>
-            </a:r>
-            <a:endParaRPr lang="en-US" sz="3200" dirty="0"/>
+              <a:rPr lang="en-US" sz="3000" dirty="0" smtClean="0"/>
+              <a:t>Business Analyst/Requirements </a:t>
+            </a:r>
+            <a:r>
+              <a:rPr lang="en-US" sz="3000" dirty="0" smtClean="0"/>
+              <a:t>Manager – Andrea, Clark</a:t>
+            </a:r>
+            <a:endParaRPr lang="en-US" sz="3000" dirty="0"/>
           </a:p>
         </p:txBody>
       </p:sp>

</xml_diff>